<commit_message>
correction typo error on slide 11
</commit_message>
<xml_diff>
--- a/Slides-RPR/2019-H1-DAA-L37-DynProg-Travelling-Salesman-Problem.pptx
+++ b/Slides-RPR/2019-H1-DAA-L37-DynProg-Travelling-Salesman-Problem.pptx
@@ -2121,7 +2121,7 @@
       </p:grpSpPr>
       <p:sp>
         <p:nvSpPr>
-          <p:cNvPr id="42" name="Design and Analysis of Algorithms   L38: Traveling Salesman Problem…"/>
+          <p:cNvPr id="42" name="Design and Analysis of Algorithms   L37: Traveling Salesman Problem…"/>
           <p:cNvSpPr txBox="1"/>
           <p:nvPr>
             <p:ph type="title"/>
@@ -2197,7 +2197,7 @@
                 <a:cs typeface="Arial"/>
                 <a:sym typeface="Arial"/>
               </a:rPr>
-              <a:t>L38: </a:t>
+              <a:t>L37: </a:t>
             </a:r>
             <a:r>
               <a:rPr sz="4400">
@@ -6630,7 +6630,7 @@
               <a:t>32</a:t>
             </a:r>
             <a:r>
-              <a:t>=g(2,Ø)=13+5=18</a:t>
+              <a:t>+g(2,Ø)=13+5=18</a:t>
             </a:r>
           </a:p>
           <a:p>
@@ -6653,7 +6653,7 @@
               <a:t>34</a:t>
             </a:r>
             <a:r>
-              <a:t>=g(4,Ø)=12+8=20</a:t>
+              <a:t>+g(4,Ø)=12+8=20</a:t>
             </a:r>
           </a:p>
           <a:p>
@@ -6676,7 +6676,7 @@
               <a:t>42</a:t>
             </a:r>
             <a:r>
-              <a:t>=g(2,Ø)=8+5=13</a:t>
+              <a:t>+g(2,Ø)=8+5=13</a:t>
             </a:r>
           </a:p>
           <a:p>
@@ -6699,7 +6699,7 @@
               <a:t>43</a:t>
             </a:r>
             <a:r>
-              <a:t>=g(3,Ø)=9+6=15</a:t>
+              <a:t>+g(3,Ø)=9+6=15</a:t>
             </a:r>
           </a:p>
           <a:p>
@@ -7692,8 +7692,8 @@
       </p:par>
     </p:tnLst>
     <p:bldLst>
+      <p:bldP build="p" bldLvl="5" animBg="1" rev="0" advAuto="0" spid="136" grpId="2"/>
       <p:bldP build="p" bldLvl="5" animBg="1" rev="0" advAuto="0" spid="102" grpId="1"/>
-      <p:bldP build="p" bldLvl="5" animBg="1" rev="0" advAuto="0" spid="136" grpId="2"/>
     </p:bldLst>
   </p:timing>
 </p:sld>
@@ -11162,10 +11162,10 @@
       </p:par>
     </p:tnLst>
     <p:bldLst>
+      <p:bldP build="whole" bldLvl="1" animBg="1" rev="0" advAuto="0" spid="179" grpId="2"/>
+      <p:bldP build="p" bldLvl="5" animBg="1" rev="0" advAuto="0" spid="177" grpId="1"/>
+      <p:bldP build="whole" bldLvl="1" animBg="1" rev="0" advAuto="0" spid="181" grpId="4"/>
       <p:bldP build="whole" bldLvl="1" animBg="1" rev="0" advAuto="0" spid="180" grpId="3"/>
-      <p:bldP build="whole" bldLvl="1" animBg="1" rev="0" advAuto="0" spid="179" grpId="2"/>
-      <p:bldP build="whole" bldLvl="1" animBg="1" rev="0" advAuto="0" spid="181" grpId="4"/>
-      <p:bldP build="p" bldLvl="5" animBg="1" rev="0" advAuto="0" spid="177" grpId="1"/>
     </p:bldLst>
   </p:timing>
 </p:sld>

</xml_diff>